<commit_message>
Update SSH key authentication.pptx
</commit_message>
<xml_diff>
--- a/Bandit/level13/SSH key authentication.pptx
+++ b/Bandit/level13/SSH key authentication.pptx
@@ -111,6 +111,11 @@
       </a:defRPr>
     </a:lvl9pPr>
   </p:defaultTextStyle>
+  <p:extLst>
+    <p:ext uri="{EFAFB233-063F-42B5-8137-9DF3F51BA10A}">
+      <p15:sldGuideLst xmlns:p15="http://schemas.microsoft.com/office/powerpoint/2012/main"/>
+    </p:ext>
+  </p:extLst>
 </p:presentation>
 </file>
 
@@ -9186,36 +9191,6 @@
           </a:p>
         </p:txBody>
       </p:sp>
-      <p:pic>
-        <p:nvPicPr>
-          <p:cNvPr id="9" name="Imagen 8">
-            <a:extLst>
-              <a:ext uri="{FF2B5EF4-FFF2-40B4-BE49-F238E27FC236}">
-                <a16:creationId xmlns:a16="http://schemas.microsoft.com/office/drawing/2014/main" id="{F86188E8-C904-7011-B454-D673FBBD5D95}"/>
-              </a:ext>
-            </a:extLst>
-          </p:cNvPr>
-          <p:cNvPicPr>
-            <a:picLocks noChangeAspect="1"/>
-          </p:cNvPicPr>
-          <p:nvPr/>
-        </p:nvPicPr>
-        <p:blipFill>
-          <a:blip r:embed="rId7"/>
-          <a:stretch>
-            <a:fillRect/>
-          </a:stretch>
-        </p:blipFill>
-        <p:spPr>
-          <a:xfrm>
-            <a:off x="5467350" y="2800350"/>
-            <a:ext cx="1257300" cy="1257300"/>
-          </a:xfrm>
-          <a:prstGeom prst="rect">
-            <a:avLst/>
-          </a:prstGeom>
-        </p:spPr>
-      </p:pic>
       <p:pic>
         <p:nvPicPr>
           <p:cNvPr id="10" name="Imagen 9" descr="Imagen que contiene cerradura, estructuras metálicas, bolsa&#10;&#10;El contenido generado por IA puede ser incorrecto.">

</xml_diff>